<commit_message>
Edited System performance section, other small edits.
</commit_message>
<xml_diff>
--- a/Figs/aartfaac_control_system.pptx
+++ b/Figs/aartfaac_control_system.pptx
@@ -5173,6 +5173,44 @@
               <a:t>1/N</a:t>
             </a:r>
             <a:endParaRPr lang="en-US" sz="1200" dirty="0"/>
+          </a:p>
+        </p:txBody>
+      </p:sp>
+      <p:sp>
+        <p:nvSpPr>
+          <p:cNvPr id="3" name="TextBox 2"/>
+          <p:cNvSpPr txBox="1"/>
+          <p:nvPr/>
+        </p:nvSpPr>
+        <p:spPr>
+          <a:xfrm>
+            <a:off x="2631074" y="210293"/>
+            <a:ext cx="473808" cy="276999"/>
+          </a:xfrm>
+          <a:prstGeom prst="rect">
+            <a:avLst/>
+          </a:prstGeom>
+          <a:noFill/>
+        </p:spPr>
+        <p:txBody>
+          <a:bodyPr wrap="none" rtlCol="0">
+            <a:spAutoFit/>
+          </a:bodyPr>
+          <a:lstStyle/>
+          <a:p>
+            <a:r>
+              <a:rPr lang="en-US" sz="1200" dirty="0" smtClean="0">
+                <a:solidFill>
+                  <a:srgbClr val="595959"/>
+                </a:solidFill>
+              </a:rPr>
+              <a:t>User</a:t>
+            </a:r>
+            <a:endParaRPr lang="en-US" sz="1200" dirty="0">
+              <a:solidFill>
+                <a:srgbClr val="595959"/>
+              </a:solidFill>
+            </a:endParaRPr>
           </a:p>
         </p:txBody>
       </p:sp>

</xml_diff>